<commit_message>
cleaned up layout and content of poster
</commit_message>
<xml_diff>
--- a/techical_poster.pptx
+++ b/techical_poster.pptx
@@ -104,6 +104,42 @@
       </a:defRPr>
     </a:lvl9pPr>
   </p:defaultTextStyle>
+  <p:extLst>
+    <p:ext uri="{EFAFB233-063F-42B5-8137-9DF3F51BA10A}">
+      <p15:sldGuideLst xmlns:p15="http://schemas.microsoft.com/office/powerpoint/2012/main">
+        <p15:guide id="1" pos="2479" userDrawn="1">
+          <p15:clr>
+            <a:srgbClr val="A4A3A4"/>
+          </p15:clr>
+        </p15:guide>
+        <p15:guide id="2" pos="211" userDrawn="1">
+          <p15:clr>
+            <a:srgbClr val="A4A3A4"/>
+          </p15:clr>
+        </p15:guide>
+        <p15:guide id="3" pos="2706" userDrawn="1">
+          <p15:clr>
+            <a:srgbClr val="A4A3A4"/>
+          </p15:clr>
+        </p15:guide>
+        <p15:guide id="4" pos="4974" userDrawn="1">
+          <p15:clr>
+            <a:srgbClr val="A4A3A4"/>
+          </p15:clr>
+        </p15:guide>
+        <p15:guide id="5" pos="5201" userDrawn="1">
+          <p15:clr>
+            <a:srgbClr val="A4A3A4"/>
+          </p15:clr>
+        </p15:guide>
+        <p15:guide id="6" pos="7469" userDrawn="1">
+          <p15:clr>
+            <a:srgbClr val="A4A3A4"/>
+          </p15:clr>
+        </p15:guide>
+      </p15:sldGuideLst>
+    </p:ext>
+  </p:extLst>
 </p:presentation>
 </file>
 
@@ -2972,8 +3008,8 @@
         </p:nvSpPr>
         <p:spPr>
           <a:xfrm>
-            <a:off x="369455" y="295564"/>
-            <a:ext cx="3509818" cy="1600438"/>
+            <a:off x="334963" y="555856"/>
+            <a:ext cx="3600450" cy="1220847"/>
           </a:xfrm>
           <a:prstGeom prst="rect">
             <a:avLst/>
@@ -2986,35 +3022,32 @@
           </a:bodyPr>
           <a:lstStyle/>
           <a:p>
+            <a:pPr>
+              <a:spcAft>
+                <a:spcPts val="200"/>
+              </a:spcAft>
+            </a:pPr>
             <a:r>
               <a:rPr lang="en-GB" sz="1400" dirty="0" smtClean="0"/>
-              <a:t>Line-following sensor</a:t>
-            </a:r>
-          </a:p>
-          <a:p>
-            <a:pPr marL="285750" indent="-285750">
-              <a:buFontTx/>
-              <a:buChar char="-"/>
+              <a:t>Mounted underneath robot, between front wheels, for mechanical protection, reduces sideways swing as the vehicle turns.</a:t>
+            </a:r>
+          </a:p>
+          <a:p>
+            <a:pPr>
+              <a:spcAft>
+                <a:spcPts val="200"/>
+              </a:spcAft>
             </a:pPr>
             <a:r>
               <a:rPr lang="en-GB" sz="1400" dirty="0" smtClean="0"/>
-              <a:t>Mounted underneath robot, between front wheels for mechanical protection, and better response. (moves sideways less as the robot turns</a:t>
-            </a:r>
-          </a:p>
-          <a:p>
-            <a:pPr marL="285750" indent="-285750">
-              <a:buFontTx/>
-              <a:buChar char="-"/>
-            </a:pPr>
-            <a:r>
-              <a:rPr lang="en-GB" sz="1400" dirty="0" smtClean="0"/>
-              <a:t>Number of elements (8) (accuracy)</a:t>
-            </a:r>
-          </a:p>
-          <a:p>
-            <a:pPr marL="285750" indent="-285750">
-              <a:buFontTx/>
-              <a:buChar char="-"/>
+              <a:t>Has eight elements, compared to previous two.</a:t>
+            </a:r>
+          </a:p>
+          <a:p>
+            <a:pPr>
+              <a:spcAft>
+                <a:spcPts val="200"/>
+              </a:spcAft>
             </a:pPr>
             <a:endParaRPr lang="en-GB" sz="1400" dirty="0"/>
           </a:p>
@@ -3028,8 +3061,8 @@
         </p:nvSpPr>
         <p:spPr>
           <a:xfrm>
-            <a:off x="369454" y="1772892"/>
-            <a:ext cx="3509817" cy="2031325"/>
+            <a:off x="4295775" y="4887220"/>
+            <a:ext cx="3600000" cy="1461939"/>
           </a:xfrm>
           <a:prstGeom prst="rect">
             <a:avLst/>
@@ -3042,30 +3075,44 @@
           </a:bodyPr>
           <a:lstStyle/>
           <a:p>
+            <a:pPr>
+              <a:spcAft>
+                <a:spcPts val="200"/>
+              </a:spcAft>
+            </a:pPr>
             <a:r>
               <a:rPr lang="en-GB" sz="1400" dirty="0" smtClean="0"/>
-              <a:t>IMU</a:t>
-            </a:r>
-          </a:p>
-          <a:p>
+              <a:t>MEMS Gyro sensor and accelerometer.</a:t>
+            </a:r>
+          </a:p>
+          <a:p>
+            <a:pPr>
+              <a:spcAft>
+                <a:spcPts val="200"/>
+              </a:spcAft>
+            </a:pPr>
             <a:r>
               <a:rPr lang="en-GB" sz="1400" dirty="0" smtClean="0"/>
-              <a:t>Contains MEMS Gyroscopic sensor and accelerometer.</a:t>
-            </a:r>
-          </a:p>
-          <a:p>
-            <a:r>
-              <a:rPr lang="en-GB" sz="1400" dirty="0" smtClean="0"/>
-              <a:t>Built-in special-purpose processor does numerical integration and can use data from external magnetometer</a:t>
-            </a:r>
-          </a:p>
-          <a:p>
+              <a:t>Built-in processor does numerical integration and can use data from external magnetometer</a:t>
+            </a:r>
+          </a:p>
+          <a:p>
+            <a:pPr>
+              <a:spcAft>
+                <a:spcPts val="200"/>
+              </a:spcAft>
+            </a:pPr>
             <a:r>
               <a:rPr lang="en-GB" sz="1400" dirty="0" smtClean="0"/>
               <a:t>Code available for automatic calibration</a:t>
             </a:r>
           </a:p>
           <a:p>
+            <a:pPr>
+              <a:spcAft>
+                <a:spcPts val="200"/>
+              </a:spcAft>
+            </a:pPr>
             <a:r>
               <a:rPr lang="en-GB" sz="1400" dirty="0" smtClean="0"/>
               <a:t>Puts out values for yaw, pitch and roll, based on gyro data.</a:t>
@@ -3081,8 +3128,8 @@
         </p:nvSpPr>
         <p:spPr>
           <a:xfrm>
-            <a:off x="369455" y="3620656"/>
-            <a:ext cx="3325090" cy="1600438"/>
+            <a:off x="334963" y="3709921"/>
+            <a:ext cx="3600450" cy="1005403"/>
           </a:xfrm>
           <a:prstGeom prst="rect">
             <a:avLst/>
@@ -3095,15 +3142,10 @@
           </a:bodyPr>
           <a:lstStyle/>
           <a:p>
-            <a:r>
-              <a:rPr lang="en-GB" sz="1400" dirty="0" smtClean="0"/>
-              <a:t>Chassis</a:t>
-            </a:r>
-          </a:p>
-          <a:p>
-            <a:pPr marL="285750" indent="-285750">
-              <a:buFontTx/>
-              <a:buChar char="-"/>
+            <a:pPr>
+              <a:spcAft>
+                <a:spcPts val="200"/>
+              </a:spcAft>
             </a:pPr>
             <a:r>
               <a:rPr lang="en-GB" sz="1400" dirty="0" smtClean="0"/>
@@ -3111,35 +3153,26 @@
             </a:r>
           </a:p>
           <a:p>
-            <a:pPr marL="285750" indent="-285750">
-              <a:buFontTx/>
-              <a:buChar char="-"/>
+            <a:pPr>
+              <a:spcAft>
+                <a:spcPts val="200"/>
+              </a:spcAft>
             </a:pPr>
             <a:r>
               <a:rPr lang="en-GB" sz="1400" dirty="0" smtClean="0"/>
-              <a:t>Tank-steering (?), allows vehicle to turn on spot</a:t>
-            </a:r>
-          </a:p>
-          <a:p>
-            <a:pPr marL="285750" indent="-285750">
-              <a:buFontTx/>
-              <a:buChar char="-"/>
+              <a:t>Vehicle can turn on spot.</a:t>
+            </a:r>
+          </a:p>
+          <a:p>
+            <a:pPr>
+              <a:spcAft>
+                <a:spcPts val="200"/>
+              </a:spcAft>
             </a:pPr>
             <a:r>
               <a:rPr lang="en-GB" sz="1400" dirty="0" smtClean="0"/>
               <a:t>One magnetic / hall effect encoder on each side for closed-loop control</a:t>
             </a:r>
-          </a:p>
-          <a:p>
-            <a:pPr marL="285750" indent="-285750">
-              <a:buFontTx/>
-              <a:buChar char="-"/>
-            </a:pPr>
-            <a:r>
-              <a:rPr lang="en-GB" sz="1400" dirty="0" smtClean="0"/>
-              <a:t>Rigid aluminium frame</a:t>
-            </a:r>
-            <a:endParaRPr lang="en-GB" sz="1400" dirty="0"/>
           </a:p>
         </p:txBody>
       </p:sp>
@@ -3151,8 +3184,8 @@
         </p:nvSpPr>
         <p:spPr>
           <a:xfrm>
-            <a:off x="480291" y="5246255"/>
-            <a:ext cx="3629891" cy="1600438"/>
+            <a:off x="334964" y="5163128"/>
+            <a:ext cx="3600450" cy="1195199"/>
           </a:xfrm>
           <a:prstGeom prst="rect">
             <a:avLst/>
@@ -3165,15 +3198,10 @@
           </a:bodyPr>
           <a:lstStyle/>
           <a:p>
-            <a:r>
-              <a:rPr lang="en-GB" sz="1400" dirty="0" smtClean="0"/>
-              <a:t>LCD</a:t>
-            </a:r>
-          </a:p>
-          <a:p>
-            <a:pPr marL="285750" indent="-285750">
-              <a:buFontTx/>
-              <a:buChar char="-"/>
+            <a:pPr>
+              <a:spcAft>
+                <a:spcPts val="200"/>
+              </a:spcAft>
             </a:pPr>
             <a:r>
               <a:rPr lang="en-GB" sz="1400" dirty="0" smtClean="0"/>
@@ -3181,23 +3209,14 @@
             </a:r>
           </a:p>
           <a:p>
-            <a:pPr marL="285750" indent="-285750">
-              <a:buFontTx/>
-              <a:buChar char="-"/>
+            <a:pPr>
+              <a:spcAft>
+                <a:spcPts val="200"/>
+              </a:spcAft>
             </a:pPr>
             <a:r>
               <a:rPr lang="en-GB" sz="1400" dirty="0" smtClean="0"/>
-              <a:t>Displays prompts for automatic calibration process</a:t>
-            </a:r>
-          </a:p>
-          <a:p>
-            <a:pPr marL="285750" indent="-285750">
-              <a:buFontTx/>
-              <a:buChar char="-"/>
-            </a:pPr>
-            <a:r>
-              <a:rPr lang="en-GB" sz="1400" dirty="0" smtClean="0"/>
-              <a:t>Displays current PID constants, and which of them is currently being modified</a:t>
+              <a:t>Displays prompts for automatic calibration Displays current PID constants, and which of them is currently being modified</a:t>
             </a:r>
             <a:endParaRPr lang="en-GB" sz="1400" dirty="0"/>
           </a:p>
@@ -3211,8 +3230,8 @@
         </p:nvSpPr>
         <p:spPr>
           <a:xfrm>
-            <a:off x="3990109" y="5163127"/>
-            <a:ext cx="3131127" cy="2031325"/>
+            <a:off x="4295775" y="2712613"/>
+            <a:ext cx="3600001" cy="1677382"/>
           </a:xfrm>
           <a:prstGeom prst="rect">
             <a:avLst/>
@@ -3225,30 +3244,21 @@
           </a:bodyPr>
           <a:lstStyle/>
           <a:p>
+            <a:pPr>
+              <a:spcAft>
+                <a:spcPts val="200"/>
+              </a:spcAft>
+            </a:pPr>
             <a:r>
               <a:rPr lang="en-GB" sz="1400" dirty="0" smtClean="0"/>
-              <a:t>Buttons</a:t>
-            </a:r>
-          </a:p>
-          <a:p>
-            <a:pPr marL="285750" indent="-285750">
-              <a:buFontTx/>
-              <a:buChar char="-"/>
-            </a:pPr>
-            <a:r>
-              <a:rPr lang="en-GB" sz="1400" dirty="0" smtClean="0"/>
-              <a:t>Trigger data capture for </a:t>
-            </a:r>
-            <a:r>
-              <a:rPr lang="en-GB" sz="1400" dirty="0" err="1" smtClean="0"/>
-              <a:t>callibration</a:t>
-            </a:r>
-            <a:endParaRPr lang="en-GB" sz="1400" dirty="0" smtClean="0"/>
-          </a:p>
-          <a:p>
-            <a:pPr marL="285750" indent="-285750">
-              <a:buFontTx/>
-              <a:buChar char="-"/>
+              <a:t>Trigger data capture for calibration</a:t>
+            </a:r>
+          </a:p>
+          <a:p>
+            <a:pPr>
+              <a:spcAft>
+                <a:spcPts val="200"/>
+              </a:spcAft>
             </a:pPr>
             <a:r>
               <a:rPr lang="en-GB" sz="1400" dirty="0" smtClean="0"/>
@@ -3256,9 +3266,10 @@
             </a:r>
           </a:p>
           <a:p>
-            <a:pPr marL="285750" indent="-285750">
-              <a:buFontTx/>
-              <a:buChar char="-"/>
+            <a:pPr>
+              <a:spcAft>
+                <a:spcPts val="200"/>
+              </a:spcAft>
             </a:pPr>
             <a:r>
               <a:rPr lang="en-GB" sz="1400" dirty="0" smtClean="0"/>
@@ -3266,21 +3277,14 @@
             </a:r>
           </a:p>
           <a:p>
-            <a:pPr marL="285750" indent="-285750">
-              <a:buFontTx/>
-              <a:buChar char="-"/>
+            <a:pPr>
+              <a:spcAft>
+                <a:spcPts val="200"/>
+              </a:spcAft>
             </a:pPr>
             <a:r>
               <a:rPr lang="en-GB" sz="1400" dirty="0" smtClean="0"/>
-              <a:t>Use Arduino’s built-in </a:t>
-            </a:r>
-            <a:r>
-              <a:rPr lang="en-GB" sz="1400" dirty="0" err="1" smtClean="0"/>
-              <a:t>pullup</a:t>
-            </a:r>
-            <a:r>
-              <a:rPr lang="en-GB" sz="1400" dirty="0" smtClean="0"/>
-              <a:t> resists to save wiring on breadboard, and reduce number of components</a:t>
+              <a:t>Use Arduino’s built-in pull-up resists to save wiring on breadboard, and reduce number of components</a:t>
             </a:r>
             <a:endParaRPr lang="en-GB" sz="1400" dirty="0"/>
           </a:p>
@@ -3294,8 +3298,8 @@
         </p:nvSpPr>
         <p:spPr>
           <a:xfrm>
-            <a:off x="7869383" y="295564"/>
-            <a:ext cx="3306618" cy="2462213"/>
+            <a:off x="8256588" y="560770"/>
+            <a:ext cx="3600001" cy="1677382"/>
           </a:xfrm>
           <a:prstGeom prst="rect">
             <a:avLst/>
@@ -3308,25 +3312,21 @@
           </a:bodyPr>
           <a:lstStyle/>
           <a:p>
+            <a:pPr>
+              <a:spcAft>
+                <a:spcPts val="200"/>
+              </a:spcAft>
+            </a:pPr>
             <a:r>
               <a:rPr lang="en-GB" sz="1400" dirty="0" smtClean="0"/>
-              <a:t>PID control</a:t>
-            </a:r>
-          </a:p>
-          <a:p>
-            <a:pPr marL="285750" indent="-285750">
-              <a:buFontTx/>
-              <a:buChar char="-"/>
-            </a:pPr>
-            <a:r>
-              <a:rPr lang="en-GB" sz="1400" dirty="0" smtClean="0"/>
-              <a:t>Allows robot to follow line at higher speed than with plain proportional control as used previously</a:t>
-            </a:r>
-          </a:p>
-          <a:p>
-            <a:pPr marL="285750" indent="-285750">
-              <a:buFontTx/>
-              <a:buChar char="-"/>
+              <a:t>Allows robot to follow line at higher speed than with old proportional control</a:t>
+            </a:r>
+          </a:p>
+          <a:p>
+            <a:pPr>
+              <a:spcAft>
+                <a:spcPts val="200"/>
+              </a:spcAft>
             </a:pPr>
             <a:r>
               <a:rPr lang="en-GB" sz="1400" dirty="0" smtClean="0"/>
@@ -3334,27 +3334,21 @@
             </a:r>
           </a:p>
           <a:p>
-            <a:pPr marL="285750" indent="-285750">
-              <a:buFontTx/>
-              <a:buChar char="-"/>
+            <a:pPr>
+              <a:spcAft>
+                <a:spcPts val="200"/>
+              </a:spcAft>
             </a:pPr>
             <a:r>
               <a:rPr lang="en-GB" sz="1400" dirty="0" smtClean="0"/>
-              <a:t>Empirically, we found that </a:t>
-            </a:r>
-            <a:r>
-              <a:rPr lang="en-GB" sz="1400" dirty="0" err="1" smtClean="0"/>
-              <a:t>ki</a:t>
-            </a:r>
-            <a:r>
-              <a:rPr lang="en-GB" sz="1400" dirty="0" smtClean="0"/>
-              <a:t> (for the integral part of the calculation) is of little use, and best set to zero, making this really PD control</a:t>
-            </a:r>
-          </a:p>
-          <a:p>
-            <a:pPr marL="285750" indent="-285750">
-              <a:buFontTx/>
-              <a:buChar char="-"/>
+              <a:t>Ki left at zero, as result of practical experiments.</a:t>
+            </a:r>
+          </a:p>
+          <a:p>
+            <a:pPr>
+              <a:spcAft>
+                <a:spcPts val="200"/>
+              </a:spcAft>
             </a:pPr>
             <a:endParaRPr lang="en-GB" sz="1400" dirty="0"/>
           </a:p>
@@ -3368,8 +3362,8 @@
         </p:nvSpPr>
         <p:spPr>
           <a:xfrm>
-            <a:off x="8220365" y="2500262"/>
-            <a:ext cx="3177309" cy="2246769"/>
+            <a:off x="8257038" y="2721763"/>
+            <a:ext cx="3600000" cy="1677382"/>
           </a:xfrm>
           <a:prstGeom prst="rect">
             <a:avLst/>
@@ -3382,15 +3376,10 @@
           </a:bodyPr>
           <a:lstStyle/>
           <a:p>
-            <a:r>
-              <a:rPr lang="en-GB" sz="1400" dirty="0" smtClean="0"/>
-              <a:t>Automatic calibration</a:t>
-            </a:r>
-          </a:p>
-          <a:p>
-            <a:pPr marL="285750" indent="-285750">
-              <a:buFontTx/>
-              <a:buChar char="-"/>
+            <a:pPr>
+              <a:spcAft>
+                <a:spcPts val="200"/>
+              </a:spcAft>
             </a:pPr>
             <a:r>
               <a:rPr lang="en-GB" sz="1400" dirty="0" smtClean="0"/>
@@ -3398,19 +3387,21 @@
             </a:r>
           </a:p>
           <a:p>
-            <a:pPr marL="285750" indent="-285750">
-              <a:buFontTx/>
-              <a:buChar char="-"/>
+            <a:pPr>
+              <a:spcAft>
+                <a:spcPts val="200"/>
+              </a:spcAft>
             </a:pPr>
             <a:r>
               <a:rPr lang="en-GB" sz="1400" dirty="0" smtClean="0"/>
-              <a:t>Automatically sets sensitivity range based on sample white and black values</a:t>
-            </a:r>
-          </a:p>
-          <a:p>
-            <a:pPr marL="285750" indent="-285750">
-              <a:buFontTx/>
-              <a:buChar char="-"/>
+              <a:t>Automatically sets sensitivity range based on sampled white and black values</a:t>
+            </a:r>
+          </a:p>
+          <a:p>
+            <a:pPr>
+              <a:spcAft>
+                <a:spcPts val="200"/>
+              </a:spcAft>
             </a:pPr>
             <a:r>
               <a:rPr lang="en-GB" sz="1400" dirty="0" smtClean="0"/>
@@ -3418,9 +3409,10 @@
             </a:r>
           </a:p>
           <a:p>
-            <a:pPr marL="285750" indent="-285750">
-              <a:buFontTx/>
-              <a:buChar char="-"/>
+            <a:pPr>
+              <a:spcAft>
+                <a:spcPts val="200"/>
+              </a:spcAft>
             </a:pPr>
             <a:r>
               <a:rPr lang="en-GB" sz="1400" dirty="0" smtClean="0"/>
@@ -3437,8 +3429,8 @@
         </p:nvSpPr>
         <p:spPr>
           <a:xfrm>
-            <a:off x="8220365" y="5221094"/>
-            <a:ext cx="3565236" cy="1384995"/>
+            <a:off x="8256588" y="4880075"/>
+            <a:ext cx="3565236" cy="1195199"/>
           </a:xfrm>
           <a:prstGeom prst="rect">
             <a:avLst/>
@@ -3451,15 +3443,10 @@
           </a:bodyPr>
           <a:lstStyle/>
           <a:p>
-            <a:r>
-              <a:rPr lang="en-GB" sz="1400" dirty="0" smtClean="0"/>
-              <a:t>Weighted averaging</a:t>
-            </a:r>
-          </a:p>
-          <a:p>
-            <a:pPr marL="285750" indent="-285750">
-              <a:buFontTx/>
-              <a:buChar char="-"/>
+            <a:pPr>
+              <a:spcAft>
+                <a:spcPts val="200"/>
+              </a:spcAft>
             </a:pPr>
             <a:r>
               <a:rPr lang="en-GB" sz="1400" dirty="0" smtClean="0"/>
@@ -3467,9 +3454,10 @@
             </a:r>
           </a:p>
           <a:p>
-            <a:pPr marL="285750" indent="-285750">
-              <a:buFontTx/>
-              <a:buChar char="-"/>
+            <a:pPr>
+              <a:spcAft>
+                <a:spcPts val="200"/>
+              </a:spcAft>
             </a:pPr>
             <a:r>
               <a:rPr lang="en-GB" sz="1400" dirty="0" smtClean="0"/>
@@ -3487,8 +3475,8 @@
         </p:nvSpPr>
         <p:spPr>
           <a:xfrm>
-            <a:off x="3879273" y="3362036"/>
-            <a:ext cx="4119418" cy="1384995"/>
+            <a:off x="334963" y="2003310"/>
+            <a:ext cx="3600450" cy="1220847"/>
           </a:xfrm>
           <a:prstGeom prst="rect">
             <a:avLst/>
@@ -3501,15 +3489,10 @@
           </a:bodyPr>
           <a:lstStyle/>
           <a:p>
-            <a:r>
-              <a:rPr lang="en-GB" sz="1400" dirty="0" smtClean="0"/>
-              <a:t>Secondary processors</a:t>
-            </a:r>
-          </a:p>
-          <a:p>
-            <a:pPr marL="285750" indent="-285750">
-              <a:buFontTx/>
-              <a:buChar char="-"/>
+            <a:pPr>
+              <a:spcAft>
+                <a:spcPts val="200"/>
+              </a:spcAft>
             </a:pPr>
             <a:r>
               <a:rPr lang="en-GB" sz="1400" dirty="0" smtClean="0"/>
@@ -3517,23 +3500,29 @@
             </a:r>
           </a:p>
           <a:p>
-            <a:pPr marL="285750" indent="-285750">
-              <a:buFontTx/>
-              <a:buChar char="-"/>
+            <a:pPr>
+              <a:spcAft>
+                <a:spcPts val="200"/>
+              </a:spcAft>
             </a:pPr>
             <a:r>
               <a:rPr lang="en-GB" sz="1400" dirty="0" smtClean="0"/>
-              <a:t>- Improves performance, accuracy</a:t>
-            </a:r>
-          </a:p>
-          <a:p>
-            <a:pPr marL="285750" indent="-285750">
-              <a:buFontTx/>
-              <a:buChar char="-"/>
+              <a:t>Improves performance</a:t>
+            </a:r>
+          </a:p>
+          <a:p>
+            <a:pPr>
+              <a:spcAft>
+                <a:spcPts val="200"/>
+              </a:spcAft>
             </a:pPr>
             <a:r>
+              <a:rPr lang="en-GB" sz="1400" dirty="0"/>
+              <a:t>M</a:t>
+            </a:r>
+            <a:r>
               <a:rPr lang="en-GB" sz="1400" dirty="0" smtClean="0"/>
-              <a:t>- makes Arduino code neater and easier to write</a:t>
+              <a:t>akes Arduino code neater and easier to write</a:t>
             </a:r>
             <a:endParaRPr lang="en-GB" sz="1400" dirty="0"/>
           </a:p>
@@ -3547,8 +3536,8 @@
         </p:nvSpPr>
         <p:spPr>
           <a:xfrm>
-            <a:off x="3879273" y="1772892"/>
-            <a:ext cx="3759200" cy="1384995"/>
+            <a:off x="4295775" y="1571445"/>
+            <a:ext cx="3600450" cy="738664"/>
           </a:xfrm>
           <a:prstGeom prst="rect">
             <a:avLst/>
@@ -3561,15 +3550,14 @@
           </a:bodyPr>
           <a:lstStyle/>
           <a:p>
+            <a:pPr>
+              <a:spcAft>
+                <a:spcPts val="200"/>
+              </a:spcAft>
+            </a:pPr>
             <a:r>
               <a:rPr lang="en-GB" sz="1400" dirty="0" smtClean="0"/>
-              <a:t>Arduino</a:t>
-            </a:r>
-          </a:p>
-          <a:p>
-            <a:r>
-              <a:rPr lang="en-GB" sz="1400" dirty="0" smtClean="0"/>
-              <a:t>- Pins 0 (Rx) and 1 (</a:t>
+              <a:t>Pins 0 (Rx) and 1 (</a:t>
             </a:r>
             <a:r>
               <a:rPr lang="en-GB" sz="1400" dirty="0" err="1" smtClean="0"/>
@@ -3577,25 +3565,7 @@
             </a:r>
             <a:r>
               <a:rPr lang="en-GB" sz="1400" dirty="0" smtClean="0"/>
-              <a:t>) dedicated to programming, to avoid disconnecting motor controller.</a:t>
-            </a:r>
-          </a:p>
-          <a:p>
-            <a:pPr marL="285750" indent="-285750">
-              <a:buFontTx/>
-              <a:buChar char="-"/>
-            </a:pPr>
-            <a:r>
-              <a:rPr lang="en-GB" sz="1400" dirty="0" smtClean="0"/>
-              <a:t>Rx and </a:t>
-            </a:r>
-            <a:r>
-              <a:rPr lang="en-GB" sz="1400" dirty="0" err="1" smtClean="0"/>
-              <a:t>Tx</a:t>
-            </a:r>
-            <a:r>
-              <a:rPr lang="en-GB" sz="1400" dirty="0" smtClean="0"/>
-              <a:t> also used to send debugging data to PC over serial connection</a:t>
+              <a:t>) dedicated to connection to PC, to avoid disconnecting motor controller, when programming  or debugging.</a:t>
             </a:r>
             <a:endParaRPr lang="en-GB" sz="1400" dirty="0"/>
           </a:p>
@@ -3609,8 +3579,8 @@
         </p:nvSpPr>
         <p:spPr>
           <a:xfrm>
-            <a:off x="3620655" y="295564"/>
-            <a:ext cx="4248727" cy="1569660"/>
+            <a:off x="4295775" y="517236"/>
+            <a:ext cx="3600001" cy="523220"/>
           </a:xfrm>
           <a:prstGeom prst="rect">
             <a:avLst/>
@@ -3623,11 +3593,553 @@
           </a:bodyPr>
           <a:lstStyle/>
           <a:p>
-            <a:r>
-              <a:rPr lang="en-GB" sz="4800" dirty="0" smtClean="0"/>
+            <a:pPr algn="ctr">
+              <a:spcAft>
+                <a:spcPts val="200"/>
+              </a:spcAft>
+            </a:pPr>
+            <a:r>
+              <a:rPr lang="en-GB" sz="2800" dirty="0" smtClean="0"/>
               <a:t>Line-following vehicle</a:t>
             </a:r>
-            <a:endParaRPr lang="en-GB" sz="4800" dirty="0"/>
+            <a:endParaRPr lang="en-GB" sz="2800" dirty="0"/>
+          </a:p>
+        </p:txBody>
+      </p:sp>
+      <p:sp>
+        <p:nvSpPr>
+          <p:cNvPr id="15" name="TextBox 14"/>
+          <p:cNvSpPr txBox="1"/>
+          <p:nvPr/>
+        </p:nvSpPr>
+        <p:spPr>
+          <a:xfrm>
+            <a:off x="334963" y="6488668"/>
+            <a:ext cx="11522075" cy="338554"/>
+          </a:xfrm>
+          <a:prstGeom prst="rect">
+            <a:avLst/>
+          </a:prstGeom>
+          <a:noFill/>
+        </p:spPr>
+        <p:txBody>
+          <a:bodyPr wrap="square" rtlCol="0">
+            <a:spAutoFit/>
+          </a:bodyPr>
+          <a:lstStyle/>
+          <a:p>
+            <a:pPr>
+              <a:spcAft>
+                <a:spcPts val="200"/>
+              </a:spcAft>
+            </a:pPr>
+            <a:r>
+              <a:rPr lang="en-GB" sz="1600" i="1" dirty="0" smtClean="0">
+                <a:solidFill>
+                  <a:schemeClr val="bg1">
+                    <a:lumMod val="65000"/>
+                  </a:schemeClr>
+                </a:solidFill>
+              </a:rPr>
+              <a:t>Group 14 (Eric Larkins) - </a:t>
+            </a:r>
+            <a:r>
+              <a:rPr lang="en-GB" sz="1600" i="1" dirty="0" err="1" smtClean="0">
+                <a:solidFill>
+                  <a:schemeClr val="bg1">
+                    <a:lumMod val="65000"/>
+                  </a:schemeClr>
+                </a:solidFill>
+              </a:rPr>
+              <a:t>Hei</a:t>
+            </a:r>
+            <a:r>
+              <a:rPr lang="en-GB" sz="1600" i="1" dirty="0" smtClean="0">
+                <a:solidFill>
+                  <a:schemeClr val="bg1">
+                    <a:lumMod val="65000"/>
+                  </a:schemeClr>
+                </a:solidFill>
+              </a:rPr>
+              <a:t> Gordon Wong, Daniel Maclaren, Kenny Clarke and Christopher Stone			January 2017</a:t>
+            </a:r>
+            <a:endParaRPr lang="en-GB" sz="1600" i="1" dirty="0">
+              <a:solidFill>
+                <a:schemeClr val="bg1">
+                  <a:lumMod val="65000"/>
+                </a:schemeClr>
+              </a:solidFill>
+            </a:endParaRPr>
+          </a:p>
+        </p:txBody>
+      </p:sp>
+      <p:sp>
+        <p:nvSpPr>
+          <p:cNvPr id="19" name="Rounded Rectangle 18"/>
+          <p:cNvSpPr/>
+          <p:nvPr/>
+        </p:nvSpPr>
+        <p:spPr>
+          <a:xfrm>
+            <a:off x="8257038" y="254296"/>
+            <a:ext cx="3600000" cy="288000"/>
+          </a:xfrm>
+          <a:prstGeom prst="roundRect">
+            <a:avLst/>
+          </a:prstGeom>
+          <a:solidFill>
+            <a:schemeClr val="bg1">
+              <a:lumMod val="95000"/>
+            </a:schemeClr>
+          </a:solidFill>
+        </p:spPr>
+        <p:style>
+          <a:lnRef idx="2">
+            <a:schemeClr val="accent3"/>
+          </a:lnRef>
+          <a:fillRef idx="1">
+            <a:schemeClr val="lt1"/>
+          </a:fillRef>
+          <a:effectRef idx="0">
+            <a:schemeClr val="accent3"/>
+          </a:effectRef>
+          <a:fontRef idx="minor">
+            <a:schemeClr val="dk1"/>
+          </a:fontRef>
+        </p:style>
+        <p:txBody>
+          <a:bodyPr rtlCol="0" anchor="ctr"/>
+          <a:lstStyle/>
+          <a:p>
+            <a:pPr algn="ctr"/>
+            <a:r>
+              <a:rPr lang="en-GB" sz="1600" dirty="0" smtClean="0"/>
+              <a:t>PID Control</a:t>
+            </a:r>
+            <a:endParaRPr lang="en-GB" sz="1600" dirty="0"/>
+          </a:p>
+        </p:txBody>
+      </p:sp>
+      <p:sp>
+        <p:nvSpPr>
+          <p:cNvPr id="20" name="Rounded Rectangle 19"/>
+          <p:cNvSpPr/>
+          <p:nvPr/>
+        </p:nvSpPr>
+        <p:spPr>
+          <a:xfrm>
+            <a:off x="8256588" y="2415290"/>
+            <a:ext cx="3600000" cy="288000"/>
+          </a:xfrm>
+          <a:prstGeom prst="roundRect">
+            <a:avLst/>
+          </a:prstGeom>
+          <a:solidFill>
+            <a:schemeClr val="bg1">
+              <a:lumMod val="95000"/>
+            </a:schemeClr>
+          </a:solidFill>
+        </p:spPr>
+        <p:style>
+          <a:lnRef idx="2">
+            <a:schemeClr val="accent3"/>
+          </a:lnRef>
+          <a:fillRef idx="1">
+            <a:schemeClr val="lt1"/>
+          </a:fillRef>
+          <a:effectRef idx="0">
+            <a:schemeClr val="accent3"/>
+          </a:effectRef>
+          <a:fontRef idx="minor">
+            <a:schemeClr val="dk1"/>
+          </a:fontRef>
+        </p:style>
+        <p:txBody>
+          <a:bodyPr rtlCol="0" anchor="ctr"/>
+          <a:lstStyle/>
+          <a:p>
+            <a:pPr algn="ctr"/>
+            <a:r>
+              <a:rPr lang="en-GB" sz="1600" dirty="0" smtClean="0"/>
+              <a:t>Automatic Calibration</a:t>
+            </a:r>
+            <a:endParaRPr lang="en-GB" sz="1600" dirty="0"/>
+          </a:p>
+        </p:txBody>
+      </p:sp>
+      <p:sp>
+        <p:nvSpPr>
+          <p:cNvPr id="21" name="Rounded Rectangle 20"/>
+          <p:cNvSpPr/>
+          <p:nvPr/>
+        </p:nvSpPr>
+        <p:spPr>
+          <a:xfrm>
+            <a:off x="8257038" y="4582838"/>
+            <a:ext cx="3600000" cy="288000"/>
+          </a:xfrm>
+          <a:prstGeom prst="roundRect">
+            <a:avLst/>
+          </a:prstGeom>
+          <a:solidFill>
+            <a:schemeClr val="bg1">
+              <a:lumMod val="95000"/>
+            </a:schemeClr>
+          </a:solidFill>
+        </p:spPr>
+        <p:style>
+          <a:lnRef idx="2">
+            <a:schemeClr val="accent3"/>
+          </a:lnRef>
+          <a:fillRef idx="1">
+            <a:schemeClr val="lt1"/>
+          </a:fillRef>
+          <a:effectRef idx="0">
+            <a:schemeClr val="accent3"/>
+          </a:effectRef>
+          <a:fontRef idx="minor">
+            <a:schemeClr val="dk1"/>
+          </a:fontRef>
+        </p:style>
+        <p:txBody>
+          <a:bodyPr rtlCol="0" anchor="ctr"/>
+          <a:lstStyle/>
+          <a:p>
+            <a:pPr algn="ctr"/>
+            <a:r>
+              <a:rPr lang="en-GB" sz="1600" dirty="0" smtClean="0"/>
+              <a:t>Weighted Averaging</a:t>
+            </a:r>
+            <a:endParaRPr lang="en-GB" sz="1600" dirty="0"/>
+          </a:p>
+        </p:txBody>
+      </p:sp>
+      <p:sp>
+        <p:nvSpPr>
+          <p:cNvPr id="22" name="Rounded Rectangle 21"/>
+          <p:cNvSpPr/>
+          <p:nvPr/>
+        </p:nvSpPr>
+        <p:spPr>
+          <a:xfrm>
+            <a:off x="4295775" y="1264974"/>
+            <a:ext cx="3600000" cy="288000"/>
+          </a:xfrm>
+          <a:prstGeom prst="roundRect">
+            <a:avLst/>
+          </a:prstGeom>
+          <a:solidFill>
+            <a:schemeClr val="bg1">
+              <a:lumMod val="95000"/>
+            </a:schemeClr>
+          </a:solidFill>
+        </p:spPr>
+        <p:style>
+          <a:lnRef idx="2">
+            <a:schemeClr val="accent3"/>
+          </a:lnRef>
+          <a:fillRef idx="1">
+            <a:schemeClr val="lt1"/>
+          </a:fillRef>
+          <a:effectRef idx="0">
+            <a:schemeClr val="accent3"/>
+          </a:effectRef>
+          <a:fontRef idx="minor">
+            <a:schemeClr val="dk1"/>
+          </a:fontRef>
+        </p:style>
+        <p:txBody>
+          <a:bodyPr rtlCol="0" anchor="ctr"/>
+          <a:lstStyle/>
+          <a:p>
+            <a:pPr algn="ctr"/>
+            <a:r>
+              <a:rPr lang="en-GB" sz="1600" dirty="0" smtClean="0"/>
+              <a:t>Arduino</a:t>
+            </a:r>
+            <a:endParaRPr lang="en-GB" sz="1600" dirty="0"/>
+          </a:p>
+        </p:txBody>
+      </p:sp>
+      <p:sp>
+        <p:nvSpPr>
+          <p:cNvPr id="23" name="Rounded Rectangle 22"/>
+          <p:cNvSpPr/>
+          <p:nvPr/>
+        </p:nvSpPr>
+        <p:spPr>
+          <a:xfrm>
+            <a:off x="4295775" y="2419064"/>
+            <a:ext cx="3600000" cy="288000"/>
+          </a:xfrm>
+          <a:prstGeom prst="roundRect">
+            <a:avLst/>
+          </a:prstGeom>
+          <a:solidFill>
+            <a:schemeClr val="bg1">
+              <a:lumMod val="95000"/>
+            </a:schemeClr>
+          </a:solidFill>
+        </p:spPr>
+        <p:style>
+          <a:lnRef idx="2">
+            <a:schemeClr val="accent3"/>
+          </a:lnRef>
+          <a:fillRef idx="1">
+            <a:schemeClr val="lt1"/>
+          </a:fillRef>
+          <a:effectRef idx="0">
+            <a:schemeClr val="accent3"/>
+          </a:effectRef>
+          <a:fontRef idx="minor">
+            <a:schemeClr val="dk1"/>
+          </a:fontRef>
+        </p:style>
+        <p:txBody>
+          <a:bodyPr rtlCol="0" anchor="ctr"/>
+          <a:lstStyle/>
+          <a:p>
+            <a:pPr algn="ctr"/>
+            <a:r>
+              <a:rPr lang="en-GB" sz="1600" dirty="0" smtClean="0"/>
+              <a:t>Buttons</a:t>
+            </a:r>
+            <a:endParaRPr lang="en-GB" sz="1600" dirty="0"/>
+          </a:p>
+        </p:txBody>
+      </p:sp>
+      <p:sp>
+        <p:nvSpPr>
+          <p:cNvPr id="24" name="Rounded Rectangle 23"/>
+          <p:cNvSpPr/>
+          <p:nvPr/>
+        </p:nvSpPr>
+        <p:spPr>
+          <a:xfrm>
+            <a:off x="4295775" y="4575751"/>
+            <a:ext cx="3600000" cy="288000"/>
+          </a:xfrm>
+          <a:prstGeom prst="roundRect">
+            <a:avLst/>
+          </a:prstGeom>
+          <a:solidFill>
+            <a:schemeClr val="bg1">
+              <a:lumMod val="95000"/>
+            </a:schemeClr>
+          </a:solidFill>
+        </p:spPr>
+        <p:style>
+          <a:lnRef idx="2">
+            <a:schemeClr val="accent3"/>
+          </a:lnRef>
+          <a:fillRef idx="1">
+            <a:schemeClr val="lt1"/>
+          </a:fillRef>
+          <a:effectRef idx="0">
+            <a:schemeClr val="accent3"/>
+          </a:effectRef>
+          <a:fontRef idx="minor">
+            <a:schemeClr val="dk1"/>
+          </a:fontRef>
+        </p:style>
+        <p:txBody>
+          <a:bodyPr rtlCol="0" anchor="ctr"/>
+          <a:lstStyle/>
+          <a:p>
+            <a:pPr algn="ctr"/>
+            <a:r>
+              <a:rPr lang="en-GB" sz="1600" dirty="0" smtClean="0"/>
+              <a:t>IMU</a:t>
+            </a:r>
+            <a:endParaRPr lang="en-GB" sz="1600" dirty="0"/>
+          </a:p>
+        </p:txBody>
+      </p:sp>
+      <p:sp>
+        <p:nvSpPr>
+          <p:cNvPr id="25" name="Rounded Rectangle 24"/>
+          <p:cNvSpPr/>
+          <p:nvPr/>
+        </p:nvSpPr>
+        <p:spPr>
+          <a:xfrm>
+            <a:off x="334963" y="258618"/>
+            <a:ext cx="3600000" cy="288000"/>
+          </a:xfrm>
+          <a:prstGeom prst="roundRect">
+            <a:avLst/>
+          </a:prstGeom>
+          <a:solidFill>
+            <a:schemeClr val="bg1">
+              <a:lumMod val="95000"/>
+            </a:schemeClr>
+          </a:solidFill>
+        </p:spPr>
+        <p:style>
+          <a:lnRef idx="2">
+            <a:schemeClr val="accent3"/>
+          </a:lnRef>
+          <a:fillRef idx="1">
+            <a:schemeClr val="lt1"/>
+          </a:fillRef>
+          <a:effectRef idx="0">
+            <a:schemeClr val="accent3"/>
+          </a:effectRef>
+          <a:fontRef idx="minor">
+            <a:schemeClr val="dk1"/>
+          </a:fontRef>
+        </p:style>
+        <p:txBody>
+          <a:bodyPr rtlCol="0" anchor="ctr"/>
+          <a:lstStyle/>
+          <a:p>
+            <a:pPr algn="ctr"/>
+            <a:r>
+              <a:rPr lang="en-GB" sz="1600" dirty="0" smtClean="0"/>
+              <a:t>Reflective Sensor Array</a:t>
+            </a:r>
+            <a:endParaRPr lang="en-GB" sz="1600" dirty="0"/>
+          </a:p>
+        </p:txBody>
+      </p:sp>
+      <p:sp>
+        <p:nvSpPr>
+          <p:cNvPr id="26" name="Rounded Rectangle 25"/>
+          <p:cNvSpPr/>
+          <p:nvPr/>
+        </p:nvSpPr>
+        <p:spPr>
+          <a:xfrm>
+            <a:off x="334963" y="1699841"/>
+            <a:ext cx="3600000" cy="288000"/>
+          </a:xfrm>
+          <a:prstGeom prst="roundRect">
+            <a:avLst/>
+          </a:prstGeom>
+          <a:solidFill>
+            <a:schemeClr val="bg1">
+              <a:lumMod val="95000"/>
+            </a:schemeClr>
+          </a:solidFill>
+        </p:spPr>
+        <p:style>
+          <a:lnRef idx="2">
+            <a:schemeClr val="accent3"/>
+          </a:lnRef>
+          <a:fillRef idx="1">
+            <a:schemeClr val="lt1"/>
+          </a:fillRef>
+          <a:effectRef idx="0">
+            <a:schemeClr val="accent3"/>
+          </a:effectRef>
+          <a:fontRef idx="minor">
+            <a:schemeClr val="dk1"/>
+          </a:fontRef>
+        </p:style>
+        <p:txBody>
+          <a:bodyPr rtlCol="0" anchor="ctr"/>
+          <a:lstStyle/>
+          <a:p>
+            <a:pPr algn="ctr"/>
+            <a:r>
+              <a:rPr lang="en-GB" sz="1600" dirty="0" smtClean="0"/>
+              <a:t>Secondary Processors</a:t>
+            </a:r>
+            <a:endParaRPr lang="en-GB" sz="1600" dirty="0"/>
+          </a:p>
+        </p:txBody>
+      </p:sp>
+      <p:sp>
+        <p:nvSpPr>
+          <p:cNvPr id="27" name="Rounded Rectangle 26"/>
+          <p:cNvSpPr/>
+          <p:nvPr/>
+        </p:nvSpPr>
+        <p:spPr>
+          <a:xfrm>
+            <a:off x="334963" y="3431122"/>
+            <a:ext cx="3600000" cy="288000"/>
+          </a:xfrm>
+          <a:prstGeom prst="roundRect">
+            <a:avLst/>
+          </a:prstGeom>
+          <a:solidFill>
+            <a:schemeClr val="bg1">
+              <a:lumMod val="95000"/>
+            </a:schemeClr>
+          </a:solidFill>
+        </p:spPr>
+        <p:style>
+          <a:lnRef idx="2">
+            <a:schemeClr val="accent3"/>
+          </a:lnRef>
+          <a:fillRef idx="1">
+            <a:schemeClr val="lt1"/>
+          </a:fillRef>
+          <a:effectRef idx="0">
+            <a:schemeClr val="accent3"/>
+          </a:effectRef>
+          <a:fontRef idx="minor">
+            <a:schemeClr val="dk1"/>
+          </a:fontRef>
+        </p:style>
+        <p:txBody>
+          <a:bodyPr rtlCol="0" anchor="ctr"/>
+          <a:lstStyle/>
+          <a:p>
+            <a:pPr algn="ctr"/>
+            <a:r>
+              <a:rPr lang="en-GB" sz="1600" dirty="0" smtClean="0"/>
+              <a:t>Chassis</a:t>
+            </a:r>
+            <a:endParaRPr lang="en-GB" sz="1600" dirty="0"/>
+          </a:p>
+        </p:txBody>
+      </p:sp>
+      <p:sp>
+        <p:nvSpPr>
+          <p:cNvPr id="28" name="Rounded Rectangle 27"/>
+          <p:cNvSpPr/>
+          <p:nvPr/>
+        </p:nvSpPr>
+        <p:spPr>
+          <a:xfrm>
+            <a:off x="334963" y="4871897"/>
+            <a:ext cx="3600000" cy="288000"/>
+          </a:xfrm>
+          <a:prstGeom prst="roundRect">
+            <a:avLst/>
+          </a:prstGeom>
+          <a:solidFill>
+            <a:schemeClr val="bg1">
+              <a:lumMod val="95000"/>
+            </a:schemeClr>
+          </a:solidFill>
+        </p:spPr>
+        <p:style>
+          <a:lnRef idx="2">
+            <a:schemeClr val="accent3"/>
+          </a:lnRef>
+          <a:fillRef idx="1">
+            <a:schemeClr val="lt1"/>
+          </a:fillRef>
+          <a:effectRef idx="0">
+            <a:schemeClr val="accent3"/>
+          </a:effectRef>
+          <a:fontRef idx="minor">
+            <a:schemeClr val="dk1"/>
+          </a:fontRef>
+        </p:style>
+        <p:txBody>
+          <a:bodyPr rtlCol="0" anchor="ctr"/>
+          <a:lstStyle/>
+          <a:p>
+            <a:pPr algn="ctr"/>
+            <a:r>
+              <a:rPr lang="en-GB" sz="1600" dirty="0" smtClean="0"/>
+              <a:t>LCD</a:t>
+            </a:r>
+            <a:endParaRPr lang="en-GB" sz="1600" dirty="0"/>
           </a:p>
         </p:txBody>
       </p:sp>

</xml_diff>